<commit_message>
Updated architekture. Added "..." provider (should show that any provider is possible). Added Common Multitouch Framework for Client Applications.
</commit_message>
<xml_diff>
--- a/Documentation/Architecture.pptx
+++ b/Documentation/Architecture.pptx
@@ -288,7 +288,8 @@
           <a:p>
             <a:fld id="{EBD7831D-C4ED-4ABB-B232-4BB43189FE6D}" type="datetimeFigureOut">
               <a:rPr lang="de-DE" smtClean="0"/>
-              <a:t>19.04.2008</a:t>
+              <a:pPr/>
+              <a:t>03.05.2008</a:t>
             </a:fld>
             <a:endParaRPr lang="de-DE"/>
           </a:p>
@@ -330,6 +331,7 @@
           <a:p>
             <a:fld id="{B810A64D-9E6C-4228-917A-8D9635FB5200}" type="slidenum">
               <a:rPr lang="de-DE" smtClean="0"/>
+              <a:pPr/>
               <a:t>‹#›</a:t>
             </a:fld>
             <a:endParaRPr lang="de-DE"/>
@@ -453,7 +455,8 @@
           <a:p>
             <a:fld id="{EBD7831D-C4ED-4ABB-B232-4BB43189FE6D}" type="datetimeFigureOut">
               <a:rPr lang="de-DE" smtClean="0"/>
-              <a:t>19.04.2008</a:t>
+              <a:pPr/>
+              <a:t>03.05.2008</a:t>
             </a:fld>
             <a:endParaRPr lang="de-DE"/>
           </a:p>
@@ -495,6 +498,7 @@
           <a:p>
             <a:fld id="{B810A64D-9E6C-4228-917A-8D9635FB5200}" type="slidenum">
               <a:rPr lang="de-DE" smtClean="0"/>
+              <a:pPr/>
               <a:t>‹#›</a:t>
             </a:fld>
             <a:endParaRPr lang="de-DE"/>
@@ -628,7 +632,8 @@
           <a:p>
             <a:fld id="{EBD7831D-C4ED-4ABB-B232-4BB43189FE6D}" type="datetimeFigureOut">
               <a:rPr lang="de-DE" smtClean="0"/>
-              <a:t>19.04.2008</a:t>
+              <a:pPr/>
+              <a:t>03.05.2008</a:t>
             </a:fld>
             <a:endParaRPr lang="de-DE"/>
           </a:p>
@@ -670,6 +675,7 @@
           <a:p>
             <a:fld id="{B810A64D-9E6C-4228-917A-8D9635FB5200}" type="slidenum">
               <a:rPr lang="de-DE" smtClean="0"/>
+              <a:pPr/>
               <a:t>‹#›</a:t>
             </a:fld>
             <a:endParaRPr lang="de-DE"/>
@@ -793,7 +799,8 @@
           <a:p>
             <a:fld id="{EBD7831D-C4ED-4ABB-B232-4BB43189FE6D}" type="datetimeFigureOut">
               <a:rPr lang="de-DE" smtClean="0"/>
-              <a:t>19.04.2008</a:t>
+              <a:pPr/>
+              <a:t>03.05.2008</a:t>
             </a:fld>
             <a:endParaRPr lang="de-DE"/>
           </a:p>
@@ -835,6 +842,7 @@
           <a:p>
             <a:fld id="{B810A64D-9E6C-4228-917A-8D9635FB5200}" type="slidenum">
               <a:rPr lang="de-DE" smtClean="0"/>
+              <a:pPr/>
               <a:t>‹#›</a:t>
             </a:fld>
             <a:endParaRPr lang="de-DE"/>
@@ -1034,7 +1042,8 @@
           <a:p>
             <a:fld id="{EBD7831D-C4ED-4ABB-B232-4BB43189FE6D}" type="datetimeFigureOut">
               <a:rPr lang="de-DE" smtClean="0"/>
-              <a:t>19.04.2008</a:t>
+              <a:pPr/>
+              <a:t>03.05.2008</a:t>
             </a:fld>
             <a:endParaRPr lang="de-DE"/>
           </a:p>
@@ -1076,6 +1085,7 @@
           <a:p>
             <a:fld id="{B810A64D-9E6C-4228-917A-8D9635FB5200}" type="slidenum">
               <a:rPr lang="de-DE" smtClean="0"/>
+              <a:pPr/>
               <a:t>‹#›</a:t>
             </a:fld>
             <a:endParaRPr lang="de-DE"/>
@@ -1317,7 +1327,8 @@
           <a:p>
             <a:fld id="{EBD7831D-C4ED-4ABB-B232-4BB43189FE6D}" type="datetimeFigureOut">
               <a:rPr lang="de-DE" smtClean="0"/>
-              <a:t>19.04.2008</a:t>
+              <a:pPr/>
+              <a:t>03.05.2008</a:t>
             </a:fld>
             <a:endParaRPr lang="de-DE"/>
           </a:p>
@@ -1359,6 +1370,7 @@
           <a:p>
             <a:fld id="{B810A64D-9E6C-4228-917A-8D9635FB5200}" type="slidenum">
               <a:rPr lang="de-DE" smtClean="0"/>
+              <a:pPr/>
               <a:t>‹#›</a:t>
             </a:fld>
             <a:endParaRPr lang="de-DE"/>
@@ -1734,7 +1746,8 @@
           <a:p>
             <a:fld id="{EBD7831D-C4ED-4ABB-B232-4BB43189FE6D}" type="datetimeFigureOut">
               <a:rPr lang="de-DE" smtClean="0"/>
-              <a:t>19.04.2008</a:t>
+              <a:pPr/>
+              <a:t>03.05.2008</a:t>
             </a:fld>
             <a:endParaRPr lang="de-DE"/>
           </a:p>
@@ -1776,6 +1789,7 @@
           <a:p>
             <a:fld id="{B810A64D-9E6C-4228-917A-8D9635FB5200}" type="slidenum">
               <a:rPr lang="de-DE" smtClean="0"/>
+              <a:pPr/>
               <a:t>‹#›</a:t>
             </a:fld>
             <a:endParaRPr lang="de-DE"/>
@@ -1847,7 +1861,8 @@
           <a:p>
             <a:fld id="{EBD7831D-C4ED-4ABB-B232-4BB43189FE6D}" type="datetimeFigureOut">
               <a:rPr lang="de-DE" smtClean="0"/>
-              <a:t>19.04.2008</a:t>
+              <a:pPr/>
+              <a:t>03.05.2008</a:t>
             </a:fld>
             <a:endParaRPr lang="de-DE"/>
           </a:p>
@@ -1889,6 +1904,7 @@
           <a:p>
             <a:fld id="{B810A64D-9E6C-4228-917A-8D9635FB5200}" type="slidenum">
               <a:rPr lang="de-DE" smtClean="0"/>
+              <a:pPr/>
               <a:t>‹#›</a:t>
             </a:fld>
             <a:endParaRPr lang="de-DE"/>
@@ -1937,7 +1953,8 @@
           <a:p>
             <a:fld id="{EBD7831D-C4ED-4ABB-B232-4BB43189FE6D}" type="datetimeFigureOut">
               <a:rPr lang="de-DE" smtClean="0"/>
-              <a:t>19.04.2008</a:t>
+              <a:pPr/>
+              <a:t>03.05.2008</a:t>
             </a:fld>
             <a:endParaRPr lang="de-DE"/>
           </a:p>
@@ -1979,6 +1996,7 @@
           <a:p>
             <a:fld id="{B810A64D-9E6C-4228-917A-8D9635FB5200}" type="slidenum">
               <a:rPr lang="de-DE" smtClean="0"/>
+              <a:pPr/>
               <a:t>‹#›</a:t>
             </a:fld>
             <a:endParaRPr lang="de-DE"/>
@@ -2209,7 +2227,8 @@
           <a:p>
             <a:fld id="{EBD7831D-C4ED-4ABB-B232-4BB43189FE6D}" type="datetimeFigureOut">
               <a:rPr lang="de-DE" smtClean="0"/>
-              <a:t>19.04.2008</a:t>
+              <a:pPr/>
+              <a:t>03.05.2008</a:t>
             </a:fld>
             <a:endParaRPr lang="de-DE"/>
           </a:p>
@@ -2251,6 +2270,7 @@
           <a:p>
             <a:fld id="{B810A64D-9E6C-4228-917A-8D9635FB5200}" type="slidenum">
               <a:rPr lang="de-DE" smtClean="0"/>
+              <a:pPr/>
               <a:t>‹#›</a:t>
             </a:fld>
             <a:endParaRPr lang="de-DE"/>
@@ -2457,7 +2477,8 @@
           <a:p>
             <a:fld id="{EBD7831D-C4ED-4ABB-B232-4BB43189FE6D}" type="datetimeFigureOut">
               <a:rPr lang="de-DE" smtClean="0"/>
-              <a:t>19.04.2008</a:t>
+              <a:pPr/>
+              <a:t>03.05.2008</a:t>
             </a:fld>
             <a:endParaRPr lang="de-DE"/>
           </a:p>
@@ -2499,6 +2520,7 @@
           <a:p>
             <a:fld id="{B810A64D-9E6C-4228-917A-8D9635FB5200}" type="slidenum">
               <a:rPr lang="de-DE" smtClean="0"/>
+              <a:pPr/>
               <a:t>‹#›</a:t>
             </a:fld>
             <a:endParaRPr lang="de-DE"/>
@@ -2665,7 +2687,8 @@
           <a:p>
             <a:fld id="{EBD7831D-C4ED-4ABB-B232-4BB43189FE6D}" type="datetimeFigureOut">
               <a:rPr lang="de-DE" smtClean="0"/>
-              <a:t>19.04.2008</a:t>
+              <a:pPr/>
+              <a:t>03.05.2008</a:t>
             </a:fld>
             <a:endParaRPr lang="de-DE"/>
           </a:p>
@@ -2743,6 +2766,7 @@
           <a:p>
             <a:fld id="{B810A64D-9E6C-4228-917A-8D9635FB5200}" type="slidenum">
               <a:rPr lang="de-DE" smtClean="0"/>
+              <a:pPr/>
               <a:t>‹#›</a:t>
             </a:fld>
             <a:endParaRPr lang="de-DE"/>
@@ -3060,290 +3084,7 @@
       </p:grpSpPr>
       <p:grpSp>
         <p:nvGrpSpPr>
-          <p:cNvPr id="39" name="Group 38"/>
-          <p:cNvGrpSpPr/>
-          <p:nvPr/>
-        </p:nvGrpSpPr>
-        <p:grpSpPr>
-          <a:xfrm>
-            <a:off x="5072066" y="4429132"/>
-            <a:ext cx="3929090" cy="2214578"/>
-            <a:chOff x="5072066" y="4429132"/>
-            <a:chExt cx="3929090" cy="2214578"/>
-          </a:xfrm>
-        </p:grpSpPr>
-        <p:sp>
-          <p:nvSpPr>
-            <p:cNvPr id="19" name="Rectangle 18"/>
-            <p:cNvSpPr/>
-            <p:nvPr/>
-          </p:nvSpPr>
-          <p:spPr>
-            <a:xfrm>
-              <a:off x="5072066" y="4429132"/>
-              <a:ext cx="3929090" cy="2214578"/>
-            </a:xfrm>
-            <a:prstGeom prst="rect">
-              <a:avLst/>
-            </a:prstGeom>
-          </p:spPr>
-          <p:style>
-            <a:lnRef idx="2">
-              <a:schemeClr val="accent1">
-                <a:shade val="50000"/>
-              </a:schemeClr>
-            </a:lnRef>
-            <a:fillRef idx="1">
-              <a:schemeClr val="accent1"/>
-            </a:fillRef>
-            <a:effectRef idx="0">
-              <a:schemeClr val="accent1"/>
-            </a:effectRef>
-            <a:fontRef idx="minor">
-              <a:schemeClr val="lt1"/>
-            </a:fontRef>
-          </p:style>
-          <p:txBody>
-            <a:bodyPr rtlCol="0" anchor="t" anchorCtr="0"/>
-            <a:lstStyle/>
-            <a:p>
-              <a:pPr algn="ctr"/>
-              <a:r>
-                <a:rPr lang="en-US" dirty="0" smtClean="0"/>
-                <a:t>Multi-touch Service</a:t>
-              </a:r>
-              <a:endParaRPr lang="de-DE" dirty="0"/>
-            </a:p>
-          </p:txBody>
-        </p:sp>
-        <p:grpSp>
-          <p:nvGrpSpPr>
-            <p:cNvPr id="38" name="Group 37"/>
-            <p:cNvGrpSpPr/>
-            <p:nvPr/>
-          </p:nvGrpSpPr>
-          <p:grpSpPr>
-            <a:xfrm>
-              <a:off x="5214941" y="4929198"/>
-              <a:ext cx="3650143" cy="1571636"/>
-              <a:chOff x="5214941" y="4929198"/>
-              <a:chExt cx="3650143" cy="1571636"/>
-            </a:xfrm>
-          </p:grpSpPr>
-          <p:sp>
-            <p:nvSpPr>
-              <p:cNvPr id="4" name="Rounded Rectangle 3"/>
-              <p:cNvSpPr/>
-              <p:nvPr/>
-            </p:nvSpPr>
-            <p:spPr>
-              <a:xfrm>
-                <a:off x="5214942" y="5429264"/>
-                <a:ext cx="3650142" cy="428628"/>
-              </a:xfrm>
-              <a:prstGeom prst="roundRect">
-                <a:avLst/>
-              </a:prstGeom>
-            </p:spPr>
-            <p:style>
-              <a:lnRef idx="0">
-                <a:schemeClr val="accent1"/>
-              </a:lnRef>
-              <a:fillRef idx="3">
-                <a:schemeClr val="accent1"/>
-              </a:fillRef>
-              <a:effectRef idx="3">
-                <a:schemeClr val="accent1"/>
-              </a:effectRef>
-              <a:fontRef idx="minor">
-                <a:schemeClr val="lt1"/>
-              </a:fontRef>
-            </p:style>
-            <p:txBody>
-              <a:bodyPr rtlCol="0" anchor="ctr"/>
-              <a:lstStyle/>
-              <a:p>
-                <a:pPr algn="ctr"/>
-                <a:r>
-                  <a:rPr lang="de-DE" dirty="0" smtClean="0"/>
-                  <a:t>Input Providers</a:t>
-                </a:r>
-                <a:endParaRPr lang="de-DE" dirty="0"/>
-              </a:p>
-            </p:txBody>
-          </p:sp>
-          <p:sp>
-            <p:nvSpPr>
-              <p:cNvPr id="5" name="Rounded Rectangle 4"/>
-              <p:cNvSpPr/>
-              <p:nvPr/>
-            </p:nvSpPr>
-            <p:spPr>
-              <a:xfrm>
-                <a:off x="6551854" y="5929330"/>
-                <a:ext cx="1156615" cy="571504"/>
-              </a:xfrm>
-              <a:prstGeom prst="roundRect">
-                <a:avLst/>
-              </a:prstGeom>
-            </p:spPr>
-            <p:style>
-              <a:lnRef idx="0">
-                <a:schemeClr val="accent1"/>
-              </a:lnRef>
-              <a:fillRef idx="3">
-                <a:schemeClr val="accent1"/>
-              </a:fillRef>
-              <a:effectRef idx="3">
-                <a:schemeClr val="accent1"/>
-              </a:effectRef>
-              <a:fontRef idx="minor">
-                <a:schemeClr val="lt1"/>
-              </a:fontRef>
-            </p:style>
-            <p:txBody>
-              <a:bodyPr rtlCol="0" anchor="ctr"/>
-              <a:lstStyle/>
-              <a:p>
-                <a:pPr algn="ctr"/>
-                <a:r>
-                  <a:rPr lang="de-DE" dirty="0" smtClean="0"/>
-                  <a:t>Multiple Mice</a:t>
-                </a:r>
-                <a:endParaRPr lang="de-DE" dirty="0"/>
-              </a:p>
-            </p:txBody>
-          </p:sp>
-          <p:sp>
-            <p:nvSpPr>
-              <p:cNvPr id="6" name="Rounded Rectangle 5"/>
-              <p:cNvSpPr/>
-              <p:nvPr/>
-            </p:nvSpPr>
-            <p:spPr>
-              <a:xfrm>
-                <a:off x="7776505" y="5929330"/>
-                <a:ext cx="1088579" cy="571504"/>
-              </a:xfrm>
-              <a:prstGeom prst="roundRect">
-                <a:avLst/>
-              </a:prstGeom>
-            </p:spPr>
-            <p:style>
-              <a:lnRef idx="0">
-                <a:schemeClr val="accent1"/>
-              </a:lnRef>
-              <a:fillRef idx="3">
-                <a:schemeClr val="accent1"/>
-              </a:fillRef>
-              <a:effectRef idx="3">
-                <a:schemeClr val="accent1"/>
-              </a:effectRef>
-              <a:fontRef idx="minor">
-                <a:schemeClr val="lt1"/>
-              </a:fontRef>
-            </p:style>
-            <p:txBody>
-              <a:bodyPr rtlCol="0" anchor="ctr"/>
-              <a:lstStyle/>
-              <a:p>
-                <a:pPr algn="ctr"/>
-                <a:r>
-                  <a:rPr lang="de-DE" dirty="0" smtClean="0"/>
-                  <a:t>Wiimote</a:t>
-                </a:r>
-                <a:endParaRPr lang="de-DE" dirty="0"/>
-              </a:p>
-            </p:txBody>
-          </p:sp>
-          <p:sp>
-            <p:nvSpPr>
-              <p:cNvPr id="7" name="Rounded Rectangle 6"/>
-              <p:cNvSpPr/>
-              <p:nvPr/>
-            </p:nvSpPr>
-            <p:spPr>
-              <a:xfrm>
-                <a:off x="5214941" y="5929330"/>
-                <a:ext cx="1268875" cy="571504"/>
-              </a:xfrm>
-              <a:prstGeom prst="roundRect">
-                <a:avLst/>
-              </a:prstGeom>
-            </p:spPr>
-            <p:style>
-              <a:lnRef idx="0">
-                <a:schemeClr val="accent1"/>
-              </a:lnRef>
-              <a:fillRef idx="3">
-                <a:schemeClr val="accent1"/>
-              </a:fillRef>
-              <a:effectRef idx="3">
-                <a:schemeClr val="accent1"/>
-              </a:effectRef>
-              <a:fontRef idx="minor">
-                <a:schemeClr val="lt1"/>
-              </a:fontRef>
-            </p:style>
-            <p:txBody>
-              <a:bodyPr rtlCol="0" anchor="ctr"/>
-              <a:lstStyle/>
-              <a:p>
-                <a:pPr algn="ctr"/>
-                <a:r>
-                  <a:rPr lang="de-DE" dirty="0" smtClean="0"/>
-                  <a:t>Optical</a:t>
-                </a:r>
-              </a:p>
-            </p:txBody>
-          </p:sp>
-          <p:sp>
-            <p:nvSpPr>
-              <p:cNvPr id="8" name="Rounded Rectangle 7"/>
-              <p:cNvSpPr/>
-              <p:nvPr/>
-            </p:nvSpPr>
-            <p:spPr>
-              <a:xfrm>
-                <a:off x="5214942" y="4929198"/>
-                <a:ext cx="3650142" cy="428628"/>
-              </a:xfrm>
-              <a:prstGeom prst="roundRect">
-                <a:avLst/>
-              </a:prstGeom>
-            </p:spPr>
-            <p:style>
-              <a:lnRef idx="0">
-                <a:schemeClr val="accent1"/>
-              </a:lnRef>
-              <a:fillRef idx="3">
-                <a:schemeClr val="accent1"/>
-              </a:fillRef>
-              <a:effectRef idx="3">
-                <a:schemeClr val="accent1"/>
-              </a:effectRef>
-              <a:fontRef idx="minor">
-                <a:schemeClr val="lt1"/>
-              </a:fontRef>
-            </p:style>
-            <p:txBody>
-              <a:bodyPr rtlCol="0" anchor="ctr"/>
-              <a:lstStyle/>
-              <a:p>
-                <a:pPr algn="ctr"/>
-                <a:r>
-                  <a:rPr lang="en-US" dirty="0" smtClean="0"/>
-                  <a:t>Multi-touch Logic</a:t>
-                </a:r>
-                <a:endParaRPr lang="de-DE" dirty="0"/>
-              </a:p>
-            </p:txBody>
-          </p:sp>
-        </p:grpSp>
-      </p:grpSp>
-      <p:grpSp>
-        <p:nvGrpSpPr>
-          <p:cNvPr id="15" name="Group 14"/>
+          <p:cNvPr id="55" name="Group 54"/>
           <p:cNvGrpSpPr/>
           <p:nvPr/>
         </p:nvGrpSpPr>
@@ -3357,7 +3098,7 @@
         </p:grpSpPr>
         <p:sp>
           <p:nvSpPr>
-            <p:cNvPr id="9" name="Rounded Rectangle 8"/>
+            <p:cNvPr id="56" name="Rounded Rectangle 55"/>
             <p:cNvSpPr/>
             <p:nvPr/>
           </p:nvSpPr>
@@ -3406,7 +3147,7 @@
         </p:sp>
         <p:sp>
           <p:nvSpPr>
-            <p:cNvPr id="10" name="Rounded Rectangle 9"/>
+            <p:cNvPr id="57" name="Rounded Rectangle 56"/>
             <p:cNvSpPr/>
             <p:nvPr/>
           </p:nvSpPr>
@@ -3449,7 +3190,7 @@
       </p:grpSp>
       <p:grpSp>
         <p:nvGrpSpPr>
-          <p:cNvPr id="16" name="Group 15"/>
+          <p:cNvPr id="58" name="Group 57"/>
           <p:cNvGrpSpPr/>
           <p:nvPr/>
         </p:nvGrpSpPr>
@@ -3463,7 +3204,7 @@
         </p:grpSpPr>
         <p:sp>
           <p:nvSpPr>
-            <p:cNvPr id="11" name="Rounded Rectangle 10"/>
+            <p:cNvPr id="59" name="Rounded Rectangle 58"/>
             <p:cNvSpPr/>
             <p:nvPr/>
           </p:nvSpPr>
@@ -3505,7 +3246,7 @@
         </p:sp>
         <p:sp>
           <p:nvSpPr>
-            <p:cNvPr id="12" name="Rounded Rectangle 11"/>
+            <p:cNvPr id="60" name="Rounded Rectangle 59"/>
             <p:cNvSpPr/>
             <p:nvPr/>
           </p:nvSpPr>
@@ -3548,7 +3289,7 @@
       </p:grpSp>
       <p:grpSp>
         <p:nvGrpSpPr>
-          <p:cNvPr id="24" name="Group 23"/>
+          <p:cNvPr id="61" name="Group 60"/>
           <p:cNvGrpSpPr/>
           <p:nvPr/>
         </p:nvGrpSpPr>
@@ -3562,7 +3303,7 @@
         </p:grpSpPr>
         <p:sp>
           <p:nvSpPr>
-            <p:cNvPr id="22" name="Rectangle 21"/>
+            <p:cNvPr id="62" name="Rectangle 61"/>
             <p:cNvSpPr/>
             <p:nvPr/>
           </p:nvSpPr>
@@ -3606,7 +3347,7 @@
         </p:sp>
         <p:grpSp>
           <p:nvGrpSpPr>
-            <p:cNvPr id="18" name="Group 17"/>
+            <p:cNvPr id="63" name="Group 17"/>
             <p:cNvGrpSpPr/>
             <p:nvPr/>
           </p:nvGrpSpPr>
@@ -3620,7 +3361,7 @@
           </p:grpSpPr>
           <p:sp>
             <p:nvSpPr>
-              <p:cNvPr id="13" name="Rounded Rectangle 12"/>
+              <p:cNvPr id="64" name="Rounded Rectangle 12"/>
               <p:cNvSpPr/>
               <p:nvPr/>
             </p:nvSpPr>
@@ -3662,7 +3403,7 @@
           </p:sp>
           <p:sp>
             <p:nvSpPr>
-              <p:cNvPr id="17" name="Rounded Rectangle 16"/>
+              <p:cNvPr id="65" name="Rounded Rectangle 64"/>
               <p:cNvSpPr/>
               <p:nvPr/>
             </p:nvSpPr>
@@ -3706,7 +3447,7 @@
       </p:grpSp>
       <p:sp>
         <p:nvSpPr>
-          <p:cNvPr id="25" name="Rounded Rectangle 24"/>
+          <p:cNvPr id="66" name="Rounded Rectangle 65"/>
           <p:cNvSpPr/>
           <p:nvPr/>
         </p:nvSpPr>
@@ -3748,7 +3489,7 @@
       </p:sp>
       <p:sp>
         <p:nvSpPr>
-          <p:cNvPr id="30" name="Left Arrow 29"/>
+          <p:cNvPr id="67" name="Left Arrow 66"/>
           <p:cNvSpPr/>
           <p:nvPr/>
         </p:nvSpPr>
@@ -3790,52 +3531,14 @@
       </p:sp>
       <p:sp>
         <p:nvSpPr>
-          <p:cNvPr id="37" name="Right Brace 36"/>
+          <p:cNvPr id="68" name="Bent-Up Arrow 67"/>
           <p:cNvSpPr/>
           <p:nvPr/>
         </p:nvSpPr>
         <p:spPr>
-          <a:xfrm rot="5400000">
-            <a:off x="2607455" y="607199"/>
-            <a:ext cx="571504" cy="5500726"/>
-          </a:xfrm>
-          <a:prstGeom prst="rightBrace">
-            <a:avLst/>
-          </a:prstGeom>
-        </p:spPr>
-        <p:style>
-          <a:lnRef idx="2">
-            <a:schemeClr val="accent5"/>
-          </a:lnRef>
-          <a:fillRef idx="0">
-            <a:schemeClr val="accent5"/>
-          </a:fillRef>
-          <a:effectRef idx="1">
-            <a:schemeClr val="accent5"/>
-          </a:effectRef>
-          <a:fontRef idx="minor">
-            <a:schemeClr val="tx1"/>
-          </a:fontRef>
-        </p:style>
-        <p:txBody>
-          <a:bodyPr rtlCol="0" anchor="ctr"/>
-          <a:lstStyle/>
-          <a:p>
-            <a:pPr algn="ctr"/>
-            <a:endParaRPr lang="de-DE"/>
-          </a:p>
-        </p:txBody>
-      </p:sp>
-      <p:sp>
-        <p:nvSpPr>
-          <p:cNvPr id="40" name="Bent-Up Arrow 39"/>
-          <p:cNvSpPr/>
-          <p:nvPr/>
-        </p:nvSpPr>
-        <p:spPr>
           <a:xfrm flipH="1">
-            <a:off x="2357422" y="3857628"/>
-            <a:ext cx="2643206" cy="1643074"/>
+            <a:off x="2357422" y="3714752"/>
+            <a:ext cx="2643206" cy="1785950"/>
           </a:xfrm>
           <a:prstGeom prst="bentUpArrow">
             <a:avLst>
@@ -3867,6 +3570,373 @@
             <a:r>
               <a:rPr lang="en-US" dirty="0" smtClean="0"/>
               <a:t>Application Interface</a:t>
+            </a:r>
+            <a:endParaRPr lang="de-DE" dirty="0"/>
+          </a:p>
+        </p:txBody>
+      </p:sp>
+      <p:grpSp>
+        <p:nvGrpSpPr>
+          <p:cNvPr id="69" name="Group 68"/>
+          <p:cNvGrpSpPr/>
+          <p:nvPr/>
+        </p:nvGrpSpPr>
+        <p:grpSpPr>
+          <a:xfrm>
+            <a:off x="5072066" y="4429132"/>
+            <a:ext cx="3929090" cy="2214578"/>
+            <a:chOff x="5072066" y="4429132"/>
+            <a:chExt cx="3929090" cy="2214578"/>
+          </a:xfrm>
+        </p:grpSpPr>
+        <p:sp>
+          <p:nvSpPr>
+            <p:cNvPr id="70" name="Rectangle 69"/>
+            <p:cNvSpPr/>
+            <p:nvPr/>
+          </p:nvSpPr>
+          <p:spPr>
+            <a:xfrm>
+              <a:off x="5072066" y="4429132"/>
+              <a:ext cx="3929090" cy="2214578"/>
+            </a:xfrm>
+            <a:prstGeom prst="rect">
+              <a:avLst/>
+            </a:prstGeom>
+          </p:spPr>
+          <p:style>
+            <a:lnRef idx="2">
+              <a:schemeClr val="accent1">
+                <a:shade val="50000"/>
+              </a:schemeClr>
+            </a:lnRef>
+            <a:fillRef idx="1">
+              <a:schemeClr val="accent1"/>
+            </a:fillRef>
+            <a:effectRef idx="0">
+              <a:schemeClr val="accent1"/>
+            </a:effectRef>
+            <a:fontRef idx="minor">
+              <a:schemeClr val="lt1"/>
+            </a:fontRef>
+          </p:style>
+          <p:txBody>
+            <a:bodyPr rtlCol="0" anchor="t" anchorCtr="0"/>
+            <a:lstStyle/>
+            <a:p>
+              <a:pPr algn="ctr"/>
+              <a:r>
+                <a:rPr lang="en-US" dirty="0" smtClean="0"/>
+                <a:t>Multi-touch Service</a:t>
+              </a:r>
+              <a:endParaRPr lang="de-DE" dirty="0"/>
+            </a:p>
+          </p:txBody>
+        </p:sp>
+        <p:grpSp>
+          <p:nvGrpSpPr>
+            <p:cNvPr id="71" name="Group 26"/>
+            <p:cNvGrpSpPr/>
+            <p:nvPr/>
+          </p:nvGrpSpPr>
+          <p:grpSpPr>
+            <a:xfrm>
+              <a:off x="5214942" y="4929198"/>
+              <a:ext cx="3650142" cy="1571636"/>
+              <a:chOff x="5214942" y="4929198"/>
+              <a:chExt cx="3650142" cy="1571636"/>
+            </a:xfrm>
+          </p:grpSpPr>
+          <p:sp>
+            <p:nvSpPr>
+              <p:cNvPr id="72" name="Rounded Rectangle 71"/>
+              <p:cNvSpPr/>
+              <p:nvPr/>
+            </p:nvSpPr>
+            <p:spPr>
+              <a:xfrm>
+                <a:off x="5214942" y="5429264"/>
+                <a:ext cx="3650142" cy="428628"/>
+              </a:xfrm>
+              <a:prstGeom prst="roundRect">
+                <a:avLst/>
+              </a:prstGeom>
+            </p:spPr>
+            <p:style>
+              <a:lnRef idx="0">
+                <a:schemeClr val="accent1"/>
+              </a:lnRef>
+              <a:fillRef idx="3">
+                <a:schemeClr val="accent1"/>
+              </a:fillRef>
+              <a:effectRef idx="3">
+                <a:schemeClr val="accent1"/>
+              </a:effectRef>
+              <a:fontRef idx="minor">
+                <a:schemeClr val="lt1"/>
+              </a:fontRef>
+            </p:style>
+            <p:txBody>
+              <a:bodyPr rtlCol="0" anchor="ctr"/>
+              <a:lstStyle/>
+              <a:p>
+                <a:pPr algn="ctr"/>
+                <a:r>
+                  <a:rPr lang="de-DE" dirty="0" smtClean="0"/>
+                  <a:t>Input Providers</a:t>
+                </a:r>
+                <a:endParaRPr lang="de-DE" dirty="0"/>
+              </a:p>
+            </p:txBody>
+          </p:sp>
+          <p:sp>
+            <p:nvSpPr>
+              <p:cNvPr id="73" name="Rounded Rectangle 72"/>
+              <p:cNvSpPr/>
+              <p:nvPr/>
+            </p:nvSpPr>
+            <p:spPr>
+              <a:xfrm>
+                <a:off x="6215074" y="5929330"/>
+                <a:ext cx="921891" cy="571504"/>
+              </a:xfrm>
+              <a:prstGeom prst="roundRect">
+                <a:avLst/>
+              </a:prstGeom>
+            </p:spPr>
+            <p:style>
+              <a:lnRef idx="0">
+                <a:schemeClr val="accent1"/>
+              </a:lnRef>
+              <a:fillRef idx="3">
+                <a:schemeClr val="accent1"/>
+              </a:fillRef>
+              <a:effectRef idx="3">
+                <a:schemeClr val="accent1"/>
+              </a:effectRef>
+              <a:fontRef idx="minor">
+                <a:schemeClr val="lt1"/>
+              </a:fontRef>
+            </p:style>
+            <p:txBody>
+              <a:bodyPr rtlCol="0" anchor="ctr"/>
+              <a:lstStyle/>
+              <a:p>
+                <a:pPr algn="ctr"/>
+                <a:r>
+                  <a:rPr lang="de-DE" sz="1400" dirty="0" smtClean="0"/>
+                  <a:t>Multiple Mice</a:t>
+                </a:r>
+                <a:endParaRPr lang="de-DE" sz="1400" dirty="0"/>
+              </a:p>
+            </p:txBody>
+          </p:sp>
+          <p:sp>
+            <p:nvSpPr>
+              <p:cNvPr id="74" name="Rounded Rectangle 73"/>
+              <p:cNvSpPr/>
+              <p:nvPr/>
+            </p:nvSpPr>
+            <p:spPr>
+              <a:xfrm>
+                <a:off x="7215206" y="5929330"/>
+                <a:ext cx="864060" cy="571504"/>
+              </a:xfrm>
+              <a:prstGeom prst="roundRect">
+                <a:avLst/>
+              </a:prstGeom>
+            </p:spPr>
+            <p:style>
+              <a:lnRef idx="0">
+                <a:schemeClr val="accent1"/>
+              </a:lnRef>
+              <a:fillRef idx="3">
+                <a:schemeClr val="accent1"/>
+              </a:fillRef>
+              <a:effectRef idx="3">
+                <a:schemeClr val="accent1"/>
+              </a:effectRef>
+              <a:fontRef idx="minor">
+                <a:schemeClr val="lt1"/>
+              </a:fontRef>
+            </p:style>
+            <p:txBody>
+              <a:bodyPr rtlCol="0" anchor="ctr"/>
+              <a:lstStyle/>
+              <a:p>
+                <a:pPr algn="ctr"/>
+                <a:r>
+                  <a:rPr lang="de-DE" sz="1400" dirty="0" smtClean="0"/>
+                  <a:t>Wiimote</a:t>
+                </a:r>
+                <a:endParaRPr lang="de-DE" sz="1400" dirty="0"/>
+              </a:p>
+            </p:txBody>
+          </p:sp>
+          <p:sp>
+            <p:nvSpPr>
+              <p:cNvPr id="75" name="Rounded Rectangle 74"/>
+              <p:cNvSpPr/>
+              <p:nvPr/>
+            </p:nvSpPr>
+            <p:spPr>
+              <a:xfrm>
+                <a:off x="5214942" y="5929330"/>
+                <a:ext cx="928695" cy="571504"/>
+              </a:xfrm>
+              <a:prstGeom prst="roundRect">
+                <a:avLst/>
+              </a:prstGeom>
+            </p:spPr>
+            <p:style>
+              <a:lnRef idx="0">
+                <a:schemeClr val="accent1"/>
+              </a:lnRef>
+              <a:fillRef idx="3">
+                <a:schemeClr val="accent1"/>
+              </a:fillRef>
+              <a:effectRef idx="3">
+                <a:schemeClr val="accent1"/>
+              </a:effectRef>
+              <a:fontRef idx="minor">
+                <a:schemeClr val="lt1"/>
+              </a:fontRef>
+            </p:style>
+            <p:txBody>
+              <a:bodyPr rtlCol="0" anchor="ctr"/>
+              <a:lstStyle/>
+              <a:p>
+                <a:pPr algn="ctr"/>
+                <a:r>
+                  <a:rPr lang="de-DE" sz="1400" dirty="0" smtClean="0"/>
+                  <a:t>Optical</a:t>
+                </a:r>
+              </a:p>
+            </p:txBody>
+          </p:sp>
+          <p:sp>
+            <p:nvSpPr>
+              <p:cNvPr id="76" name="Rounded Rectangle 75"/>
+              <p:cNvSpPr/>
+              <p:nvPr/>
+            </p:nvSpPr>
+            <p:spPr>
+              <a:xfrm>
+                <a:off x="5214942" y="4929198"/>
+                <a:ext cx="3650142" cy="428628"/>
+              </a:xfrm>
+              <a:prstGeom prst="roundRect">
+                <a:avLst/>
+              </a:prstGeom>
+            </p:spPr>
+            <p:style>
+              <a:lnRef idx="0">
+                <a:schemeClr val="accent1"/>
+              </a:lnRef>
+              <a:fillRef idx="3">
+                <a:schemeClr val="accent1"/>
+              </a:fillRef>
+              <a:effectRef idx="3">
+                <a:schemeClr val="accent1"/>
+              </a:effectRef>
+              <a:fontRef idx="minor">
+                <a:schemeClr val="lt1"/>
+              </a:fontRef>
+            </p:style>
+            <p:txBody>
+              <a:bodyPr rtlCol="0" anchor="ctr"/>
+              <a:lstStyle/>
+              <a:p>
+                <a:pPr algn="ctr"/>
+                <a:r>
+                  <a:rPr lang="en-US" dirty="0" smtClean="0"/>
+                  <a:t>Multi-touch Logic</a:t>
+                </a:r>
+                <a:endParaRPr lang="de-DE" dirty="0"/>
+              </a:p>
+            </p:txBody>
+          </p:sp>
+          <p:sp>
+            <p:nvSpPr>
+              <p:cNvPr id="77" name="Rounded Rectangle 76"/>
+              <p:cNvSpPr/>
+              <p:nvPr/>
+            </p:nvSpPr>
+            <p:spPr>
+              <a:xfrm>
+                <a:off x="8143900" y="5929330"/>
+                <a:ext cx="714381" cy="571504"/>
+              </a:xfrm>
+              <a:prstGeom prst="roundRect">
+                <a:avLst/>
+              </a:prstGeom>
+            </p:spPr>
+            <p:style>
+              <a:lnRef idx="0">
+                <a:schemeClr val="accent1"/>
+              </a:lnRef>
+              <a:fillRef idx="3">
+                <a:schemeClr val="accent1"/>
+              </a:fillRef>
+              <a:effectRef idx="3">
+                <a:schemeClr val="accent1"/>
+              </a:effectRef>
+              <a:fontRef idx="minor">
+                <a:schemeClr val="lt1"/>
+              </a:fontRef>
+            </p:style>
+            <p:txBody>
+              <a:bodyPr rtlCol="0" anchor="ctr"/>
+              <a:lstStyle/>
+              <a:p>
+                <a:pPr algn="ctr"/>
+                <a:r>
+                  <a:rPr lang="de-DE" sz="1400" dirty="0" smtClean="0"/>
+                  <a:t>...</a:t>
+                </a:r>
+                <a:endParaRPr lang="de-DE" sz="1400" dirty="0" smtClean="0"/>
+              </a:p>
+            </p:txBody>
+          </p:sp>
+        </p:grpSp>
+      </p:grpSp>
+      <p:sp>
+        <p:nvSpPr>
+          <p:cNvPr id="78" name="Rounded Rectangle 77"/>
+          <p:cNvSpPr/>
+          <p:nvPr/>
+        </p:nvSpPr>
+        <p:spPr>
+          <a:xfrm>
+            <a:off x="357158" y="3214686"/>
+            <a:ext cx="5072098" cy="357190"/>
+          </a:xfrm>
+          <a:prstGeom prst="roundRect">
+            <a:avLst/>
+          </a:prstGeom>
+        </p:spPr>
+        <p:style>
+          <a:lnRef idx="1">
+            <a:schemeClr val="dk1"/>
+          </a:lnRef>
+          <a:fillRef idx="2">
+            <a:schemeClr val="dk1"/>
+          </a:fillRef>
+          <a:effectRef idx="1">
+            <a:schemeClr val="dk1"/>
+          </a:effectRef>
+          <a:fontRef idx="minor">
+            <a:schemeClr val="dk1"/>
+          </a:fontRef>
+        </p:style>
+        <p:txBody>
+          <a:bodyPr rtlCol="0" anchor="ctr"/>
+          <a:lstStyle/>
+          <a:p>
+            <a:pPr algn="ctr"/>
+            <a:r>
+              <a:rPr lang="de-DE" dirty="0" smtClean="0"/>
+              <a:t>Common Multi-touch Framework</a:t>
             </a:r>
             <a:endParaRPr lang="de-DE" dirty="0"/>
           </a:p>

</xml_diff>